<commit_message>
fixes application & presentation2.1
</commit_message>
<xml_diff>
--- a/HandsOn/Group19/presentation/Calidad_del_aire_en_Madrid.pptx
+++ b/HandsOn/Group19/presentation/Calidad_del_aire_en_Madrid.pptx
@@ -253,7 +253,7 @@
   </p:defaultTextStyle>
   <p:extLst>
     <p:ext uri="http://customooxmlschemas.google.com/">
-      <go:slidesCustomData xmlns:go="http://customooxmlschemas.google.com/" r:id="rId16" roundtripDataSignature="AMtx7mi+0rTxXtazhQpV7rMIB6m5q8yP8w=="/>
+      <go:slidesCustomData xmlns:go="http://customooxmlschemas.google.com/" r:id="rId16" roundtripDataSignature="AMtx7mhC0nQk+8/C8xn5KfRt1TP7fIoa0g=="/>
     </p:ext>
   </p:extLst>
 </p:presentation>
@@ -18268,34 +18268,6 @@
         </p:blipFill>
         <p:spPr>
           <a:xfrm>
-            <a:off x="4475425" y="2355774"/>
-            <a:ext cx="3572974" cy="2448650"/>
-          </a:xfrm>
-          <a:prstGeom prst="rect">
-            <a:avLst/>
-          </a:prstGeom>
-          <a:noFill/>
-          <a:ln>
-            <a:noFill/>
-          </a:ln>
-        </p:spPr>
-      </p:pic>
-      <p:pic>
-        <p:nvPicPr>
-          <p:cNvPr id="292" name="Google Shape;292;p10"/>
-          <p:cNvPicPr preferRelativeResize="0"/>
-          <p:nvPr/>
-        </p:nvPicPr>
-        <p:blipFill>
-          <a:blip r:embed="rId6">
-            <a:alphaModFix/>
-          </a:blip>
-          <a:stretch>
-            <a:fillRect/>
-          </a:stretch>
-        </p:blipFill>
-        <p:spPr>
-          <a:xfrm>
             <a:off x="628425" y="5019574"/>
             <a:ext cx="7419975" cy="1552575"/>
           </a:xfrm>
@@ -18310,7 +18282,7 @@
       </p:pic>
       <p:sp>
         <p:nvSpPr>
-          <p:cNvPr id="293" name="Google Shape;293;p10"/>
+          <p:cNvPr id="292" name="Google Shape;292;p10"/>
           <p:cNvSpPr/>
           <p:nvPr/>
         </p:nvSpPr>
@@ -18355,6 +18327,34 @@
       </p:sp>
       <p:pic>
         <p:nvPicPr>
+          <p:cNvPr id="293" name="Google Shape;293;p10"/>
+          <p:cNvPicPr preferRelativeResize="0"/>
+          <p:nvPr/>
+        </p:nvPicPr>
+        <p:blipFill>
+          <a:blip r:embed="rId6">
+            <a:alphaModFix/>
+          </a:blip>
+          <a:stretch>
+            <a:fillRect/>
+          </a:stretch>
+        </p:blipFill>
+        <p:spPr>
+          <a:xfrm>
+            <a:off x="1305675" y="1759638"/>
+            <a:ext cx="1983675" cy="1983675"/>
+          </a:xfrm>
+          <a:prstGeom prst="rect">
+            <a:avLst/>
+          </a:prstGeom>
+          <a:noFill/>
+          <a:ln>
+            <a:noFill/>
+          </a:ln>
+        </p:spPr>
+      </p:pic>
+      <p:pic>
+        <p:nvPicPr>
           <p:cNvPr id="294" name="Google Shape;294;p10"/>
           <p:cNvPicPr preferRelativeResize="0"/>
           <p:nvPr/>
@@ -18369,8 +18369,8 @@
         </p:blipFill>
         <p:spPr>
           <a:xfrm>
-            <a:off x="1305675" y="1759638"/>
-            <a:ext cx="1983675" cy="1983675"/>
+            <a:off x="4226075" y="1843088"/>
+            <a:ext cx="3553137" cy="3024086"/>
           </a:xfrm>
           <a:prstGeom prst="rect">
             <a:avLst/>

</xml_diff>